<commit_message>
just left with ppt
</commit_message>
<xml_diff>
--- a/Orange_Handwritten_Scribbles_Athleisure_Wear_Product_Marketing_Presentation.pptx
+++ b/Orange_Handwritten_Scribbles_Athleisure_Wear_Product_Marketing_Presentation.pptx
@@ -342,7 +342,7 @@
             <a:fld id="{1D8BD707-D9CF-40AE-B4C6-C98DA3205C09}" type="datetimeFigureOut">
               <a:rPr lang="en-US" smtClean="0"/>
               <a:pPr/>
-              <a:t>8/29/2020</a:t>
+              <a:t>8/31/2020</a:t>
             </a:fld>
             <a:endParaRPr lang="en-US"/>
           </a:p>
@@ -507,7 +507,7 @@
             <a:fld id="{1D8BD707-D9CF-40AE-B4C6-C98DA3205C09}" type="datetimeFigureOut">
               <a:rPr lang="en-US" smtClean="0"/>
               <a:pPr/>
-              <a:t>8/29/2020</a:t>
+              <a:t>8/31/2020</a:t>
             </a:fld>
             <a:endParaRPr lang="en-US"/>
           </a:p>
@@ -682,7 +682,7 @@
             <a:fld id="{1D8BD707-D9CF-40AE-B4C6-C98DA3205C09}" type="datetimeFigureOut">
               <a:rPr lang="en-US" smtClean="0"/>
               <a:pPr/>
-              <a:t>8/29/2020</a:t>
+              <a:t>8/31/2020</a:t>
             </a:fld>
             <a:endParaRPr lang="en-US"/>
           </a:p>
@@ -847,7 +847,7 @@
             <a:fld id="{1D8BD707-D9CF-40AE-B4C6-C98DA3205C09}" type="datetimeFigureOut">
               <a:rPr lang="en-US" smtClean="0"/>
               <a:pPr/>
-              <a:t>8/29/2020</a:t>
+              <a:t>8/31/2020</a:t>
             </a:fld>
             <a:endParaRPr lang="en-US"/>
           </a:p>
@@ -1089,7 +1089,7 @@
             <a:fld id="{1D8BD707-D9CF-40AE-B4C6-C98DA3205C09}" type="datetimeFigureOut">
               <a:rPr lang="en-US" smtClean="0"/>
               <a:pPr/>
-              <a:t>8/29/2020</a:t>
+              <a:t>8/31/2020</a:t>
             </a:fld>
             <a:endParaRPr lang="en-US"/>
           </a:p>
@@ -1371,7 +1371,7 @@
             <a:fld id="{1D8BD707-D9CF-40AE-B4C6-C98DA3205C09}" type="datetimeFigureOut">
               <a:rPr lang="en-US" smtClean="0"/>
               <a:pPr/>
-              <a:t>8/29/2020</a:t>
+              <a:t>8/31/2020</a:t>
             </a:fld>
             <a:endParaRPr lang="en-US"/>
           </a:p>
@@ -1787,7 +1787,7 @@
             <a:fld id="{1D8BD707-D9CF-40AE-B4C6-C98DA3205C09}" type="datetimeFigureOut">
               <a:rPr lang="en-US" smtClean="0"/>
               <a:pPr/>
-              <a:t>8/29/2020</a:t>
+              <a:t>8/31/2020</a:t>
             </a:fld>
             <a:endParaRPr lang="en-US"/>
           </a:p>
@@ -1901,7 +1901,7 @@
             <a:fld id="{1D8BD707-D9CF-40AE-B4C6-C98DA3205C09}" type="datetimeFigureOut">
               <a:rPr lang="en-US" smtClean="0"/>
               <a:pPr/>
-              <a:t>8/29/2020</a:t>
+              <a:t>8/31/2020</a:t>
             </a:fld>
             <a:endParaRPr lang="en-US"/>
           </a:p>
@@ -1993,7 +1993,7 @@
             <a:fld id="{1D8BD707-D9CF-40AE-B4C6-C98DA3205C09}" type="datetimeFigureOut">
               <a:rPr lang="en-US" smtClean="0"/>
               <a:pPr/>
-              <a:t>8/29/2020</a:t>
+              <a:t>8/31/2020</a:t>
             </a:fld>
             <a:endParaRPr lang="en-US"/>
           </a:p>
@@ -2265,7 +2265,7 @@
             <a:fld id="{1D8BD707-D9CF-40AE-B4C6-C98DA3205C09}" type="datetimeFigureOut">
               <a:rPr lang="en-US" smtClean="0"/>
               <a:pPr/>
-              <a:t>8/29/2020</a:t>
+              <a:t>8/31/2020</a:t>
             </a:fld>
             <a:endParaRPr lang="en-US"/>
           </a:p>
@@ -2514,7 +2514,7 @@
             <a:fld id="{1D8BD707-D9CF-40AE-B4C6-C98DA3205C09}" type="datetimeFigureOut">
               <a:rPr lang="en-US" smtClean="0"/>
               <a:pPr/>
-              <a:t>8/29/2020</a:t>
+              <a:t>8/31/2020</a:t>
             </a:fld>
             <a:endParaRPr lang="en-US"/>
           </a:p>
@@ -2578,20 +2578,22 @@
       <p:bgPr>
         <a:gradFill flip="none" rotWithShape="1">
           <a:gsLst>
-            <a:gs pos="6000">
+            <a:gs pos="26000">
               <a:srgbClr val="202040">
-                <a:alpha val="52000"/>
+                <a:alpha val="63000"/>
               </a:srgbClr>
             </a:gs>
             <a:gs pos="100000">
-              <a:srgbClr val="FFDB69"/>
+              <a:srgbClr val="FFBD69"/>
             </a:gs>
-            <a:gs pos="91000">
-              <a:srgbClr val="FFDB69"/>
+            <a:gs pos="88000">
+              <a:srgbClr val="FFBD69">
+                <a:alpha val="83000"/>
+              </a:srgbClr>
             </a:gs>
-            <a:gs pos="100000">
-              <a:srgbClr val="FFDB69">
-                <a:alpha val="4000"/>
+            <a:gs pos="96000">
+              <a:srgbClr val="FFBD69">
+                <a:alpha val="76000"/>
               </a:srgbClr>
             </a:gs>
           </a:gsLst>
@@ -2744,7 +2746,7 @@
             <a:fld id="{1D8BD707-D9CF-40AE-B4C6-C98DA3205C09}" type="datetimeFigureOut">
               <a:rPr lang="en-US" smtClean="0"/>
               <a:pPr/>
-              <a:t>8/29/2020</a:t>
+              <a:t>8/31/2020</a:t>
             </a:fld>
             <a:endParaRPr lang="en-US"/>
           </a:p>
@@ -3131,7 +3133,7 @@
           </a:prstGeom>
         </p:spPr>
         <p:txBody>
-          <a:bodyPr lIns="0" tIns="0" rIns="0" bIns="0" rtlCol="0" anchor="t">
+          <a:bodyPr wrap="square" lIns="0" tIns="0" rIns="0" bIns="0" rtlCol="0" anchor="t">
             <a:spAutoFit/>
           </a:bodyPr>
           <a:lstStyle/>
@@ -4494,7 +4496,7 @@
                   </a:solidFill>
                   <a:latin typeface="Bryndan Write"/>
                 </a:rPr>
-                <a:t>Dear lectures,</a:t>
+                <a:t>Dear lecturers,</a:t>
               </a:r>
             </a:p>
           </p:txBody>
@@ -4636,7 +4638,7 @@
         <p:spPr>
           <a:xfrm>
             <a:off x="441865" y="458143"/>
-            <a:ext cx="17404270" cy="2346325"/>
+            <a:ext cx="17404270" cy="2372444"/>
           </a:xfrm>
           <a:prstGeom prst="rect">
             <a:avLst/>
@@ -4654,13 +4656,13 @@
               </a:lnSpc>
             </a:pPr>
             <a:r>
-              <a:rPr lang="en-US" sz="8000">
+              <a:rPr lang="en-US" sz="8000" dirty="0">
                 <a:solidFill>
                   <a:srgbClr val="0D121A"/>
                 </a:solidFill>
                 <a:latin typeface="Abhaya Libre Regular Bold"/>
               </a:rPr>
-              <a:t>A MILLION PROBLEMS, ONE SOLUTION. PRODIGO!</a:t>
+              <a:t> MILLION PROBLEMS, ONE SOLUTION. PRODIGO!</a:t>
             </a:r>
           </a:p>
         </p:txBody>

</xml_diff>